<commit_message>
Update Another AI Path Building Genetic Algorithms in CSharp and .NET.pptx
</commit_message>
<xml_diff>
--- a/Another AI Path Building Genetic Algorithms in CSharp and .NET.pptx
+++ b/Another AI Path Building Genetic Algorithms in CSharp and .NET.pptx
@@ -269,7 +269,7 @@
 <file path=ppt/revisionInfo.xml><?xml version="1.0" encoding="utf-8"?>
 <p1510:revInfo xmlns:a="http://schemas.openxmlformats.org/drawingml/2006/main" xmlns:r="http://schemas.openxmlformats.org/officeDocument/2006/relationships" xmlns:p1510="http://schemas.microsoft.com/office/powerpoint/2015/10/main">
   <p1510:revLst>
-    <p1510:client id="{CD146D90-A985-45FA-91AC-B19C23C6E650}" v="129" dt="2023-02-19T02:19:49.050"/>
+    <p1510:client id="{CD146D90-A985-45FA-91AC-B19C23C6E650}" v="130" dt="2023-02-20T20:16:07.413"/>
   </p1510:revLst>
 </p1510:revInfo>
 </file>
@@ -500,7 +500,7 @@
   <pc:docChgLst>
     <pc:chgData name="Chris Woodruff" userId="2dbf025665e4d94d" providerId="LiveId" clId="{CD146D90-A985-45FA-91AC-B19C23C6E650}"/>
     <pc:docChg chg="undo custSel addSld delSld modSld">
-      <pc:chgData name="Chris Woodruff" userId="2dbf025665e4d94d" providerId="LiveId" clId="{CD146D90-A985-45FA-91AC-B19C23C6E650}" dt="2023-02-19T02:19:49.050" v="280" actId="20577"/>
+      <pc:chgData name="Chris Woodruff" userId="2dbf025665e4d94d" providerId="LiveId" clId="{CD146D90-A985-45FA-91AC-B19C23C6E650}" dt="2023-02-20T20:16:15.895" v="285" actId="1076"/>
       <pc:docMkLst>
         <pc:docMk/>
       </pc:docMkLst>
@@ -644,8 +644,8 @@
           </ac:spMkLst>
         </pc:spChg>
       </pc:sldChg>
-      <pc:sldChg chg="delSp modSp mod">
-        <pc:chgData name="Chris Woodruff" userId="2dbf025665e4d94d" providerId="LiveId" clId="{CD146D90-A985-45FA-91AC-B19C23C6E650}" dt="2023-02-18T16:48:37.920" v="216" actId="20577"/>
+      <pc:sldChg chg="addSp delSp modSp mod">
+        <pc:chgData name="Chris Woodruff" userId="2dbf025665e4d94d" providerId="LiveId" clId="{CD146D90-A985-45FA-91AC-B19C23C6E650}" dt="2023-02-20T20:16:15.895" v="285" actId="1076"/>
         <pc:sldMkLst>
           <pc:docMk/>
           <pc:sldMk cId="0" sldId="277"/>
@@ -682,6 +682,14 @@
             <ac:grpSpMk id="4808" creationId="{00000000-0000-0000-0000-000000000000}"/>
           </ac:grpSpMkLst>
         </pc:grpChg>
+        <pc:picChg chg="add mod">
+          <ac:chgData name="Chris Woodruff" userId="2dbf025665e4d94d" providerId="LiveId" clId="{CD146D90-A985-45FA-91AC-B19C23C6E650}" dt="2023-02-20T20:16:15.895" v="285" actId="1076"/>
+          <ac:picMkLst>
+            <pc:docMk/>
+            <pc:sldMk cId="0" sldId="277"/>
+            <ac:picMk id="3" creationId="{D0F7C516-3032-752E-4413-83FD2F922245}"/>
+          </ac:picMkLst>
+        </pc:picChg>
       </pc:sldChg>
       <pc:sldChg chg="modSp mod">
         <pc:chgData name="Chris Woodruff" userId="2dbf025665e4d94d" providerId="LiveId" clId="{CD146D90-A985-45FA-91AC-B19C23C6E650}" dt="2023-02-18T16:48:57.102" v="217" actId="20577"/>
@@ -1078,7 +1086,7 @@
           <a:p>
             <a:fld id="{249989A5-66D3-413A-AF0E-8EF3AB32FA8C}" type="datetimeFigureOut">
               <a:rPr lang="en-US" smtClean="0"/>
-              <a:t>2/18/2023</a:t>
+              <a:t>2/20/2023</a:t>
             </a:fld>
             <a:endParaRPr lang="en-US"/>
           </a:p>
@@ -20022,6 +20030,42 @@
           <a:ln>
             <a:noFill/>
           </a:ln>
+        </p:spPr>
+      </p:pic>
+      <p:pic>
+        <p:nvPicPr>
+          <p:cNvPr id="3" name="Picture 2" descr="Qr code&#10;&#10;Description automatically generated">
+            <a:extLst>
+              <a:ext uri="{FF2B5EF4-FFF2-40B4-BE49-F238E27FC236}">
+                <a16:creationId xmlns:a16="http://schemas.microsoft.com/office/drawing/2014/main" id="{D0F7C516-3032-752E-4413-83FD2F922245}"/>
+              </a:ext>
+            </a:extLst>
+          </p:cNvPr>
+          <p:cNvPicPr>
+            <a:picLocks noChangeAspect="1"/>
+          </p:cNvPicPr>
+          <p:nvPr/>
+        </p:nvPicPr>
+        <p:blipFill>
+          <a:blip r:embed="rId6">
+            <a:extLst>
+              <a:ext uri="{28A0092B-C50C-407E-A947-70E740481C1C}">
+                <a14:useLocalDpi xmlns:a14="http://schemas.microsoft.com/office/drawing/2010/main" val="0"/>
+              </a:ext>
+            </a:extLst>
+          </a:blip>
+          <a:stretch>
+            <a:fillRect/>
+          </a:stretch>
+        </p:blipFill>
+        <p:spPr>
+          <a:xfrm>
+            <a:off x="766909" y="1275203"/>
+            <a:ext cx="3530122" cy="4120662"/>
+          </a:xfrm>
+          <a:prstGeom prst="rect">
+            <a:avLst/>
+          </a:prstGeom>
         </p:spPr>
       </p:pic>
     </p:spTree>

</xml_diff>